<commit_message>
3dvis14-interaction: Chart, structure and conclusion update.
git-svn-id: https://scivis.itn.liu.se/svn/publications/workinprogress/3dvis14-interaction@5737 cd0c9ba3-fe29-0410-b0c2-9a6eeba77867
</commit_message>
<xml_diff>
--- a/classifiy_diagram.pptx
+++ b/classifiy_diagram.pptx
@@ -3067,8 +3067,8 @@
         </p:nvSpPr>
         <p:spPr>
           <a:xfrm>
-            <a:off x="98607" y="1063022"/>
-            <a:ext cx="3369014" cy="535389"/>
+            <a:off x="453555" y="433083"/>
+            <a:ext cx="3096665" cy="1719045"/>
           </a:xfrm>
           <a:prstGeom prst="rect">
             <a:avLst/>
@@ -3090,51 +3090,6 @@
           </a:fillRef>
           <a:effectRef idx="0">
             <a:schemeClr val="accent6"/>
-          </a:effectRef>
-          <a:fontRef idx="minor">
-            <a:schemeClr val="lt1"/>
-          </a:fontRef>
-        </p:style>
-        <p:txBody>
-          <a:bodyPr rtlCol="0" anchor="ctr"/>
-          <a:lstStyle/>
-          <a:p>
-            <a:pPr algn="ctr"/>
-            <a:endParaRPr lang="sv-SE" dirty="0" smtClean="0"/>
-          </a:p>
-        </p:txBody>
-      </p:sp>
-      <p:sp>
-        <p:nvSpPr>
-          <p:cNvPr id="2" name="Rectangle 1"/>
-          <p:cNvSpPr/>
-          <p:nvPr/>
-        </p:nvSpPr>
-        <p:spPr>
-          <a:xfrm>
-            <a:off x="3777308" y="564991"/>
-            <a:ext cx="254665" cy="254665"/>
-          </a:xfrm>
-          <a:prstGeom prst="rect">
-            <a:avLst/>
-          </a:prstGeom>
-          <a:solidFill>
-            <a:schemeClr val="accent1">
-              <a:alpha val="50000"/>
-            </a:schemeClr>
-          </a:solidFill>
-        </p:spPr>
-        <p:style>
-          <a:lnRef idx="2">
-            <a:schemeClr val="accent1">
-              <a:shade val="50000"/>
-            </a:schemeClr>
-          </a:lnRef>
-          <a:fillRef idx="1">
-            <a:schemeClr val="accent1"/>
-          </a:fillRef>
-          <a:effectRef idx="0">
-            <a:schemeClr val="accent1"/>
           </a:effectRef>
           <a:fontRef idx="minor">
             <a:schemeClr val="lt1"/>
@@ -3291,7 +3246,7 @@
         </p:nvSpPr>
         <p:spPr>
           <a:xfrm flipH="1">
-            <a:off x="4003988" y="1279837"/>
+            <a:off x="4003988" y="1439995"/>
             <a:ext cx="3332348" cy="338554"/>
           </a:xfrm>
           <a:prstGeom prst="rect">
@@ -3309,7 +3264,7 @@
               <a:rPr lang="sv-SE" sz="1600" dirty="0" smtClean="0">
                 <a:latin typeface="Garamond" pitchFamily="18" charset="0"/>
               </a:rPr>
-              <a:t>Touchless (Kinect)</a:t>
+              <a:t>Touchless</a:t>
             </a:r>
             <a:endParaRPr lang="sv-SE" sz="1600" dirty="0">
               <a:latin typeface="Garamond" pitchFamily="18" charset="0"/>
@@ -3325,7 +3280,7 @@
         </p:nvSpPr>
         <p:spPr>
           <a:xfrm flipH="1">
-            <a:off x="4003988" y="1665928"/>
+            <a:off x="4003988" y="1826086"/>
             <a:ext cx="2540328" cy="338554"/>
           </a:xfrm>
           <a:prstGeom prst="rect">
@@ -3353,47 +3308,13 @@
       </p:sp>
       <p:sp>
         <p:nvSpPr>
-          <p:cNvPr id="68" name="TextBox 67"/>
-          <p:cNvSpPr txBox="1"/>
-          <p:nvPr/>
-        </p:nvSpPr>
-        <p:spPr>
-          <a:xfrm flipH="1">
-            <a:off x="4003988" y="507655"/>
-            <a:ext cx="3332348" cy="338554"/>
-          </a:xfrm>
-          <a:prstGeom prst="rect">
-            <a:avLst/>
-          </a:prstGeom>
-          <a:noFill/>
-        </p:spPr>
-        <p:txBody>
-          <a:bodyPr wrap="square" rtlCol="0">
-            <a:spAutoFit/>
-          </a:bodyPr>
-          <a:lstStyle/>
-          <a:p>
-            <a:r>
-              <a:rPr lang="sv-SE" sz="1600" dirty="0" smtClean="0">
-                <a:latin typeface="Garamond" pitchFamily="18" charset="0"/>
-              </a:rPr>
-              <a:t>Mouse/Keyboard</a:t>
-            </a:r>
-            <a:endParaRPr lang="sv-SE" sz="1600" dirty="0">
-              <a:latin typeface="Garamond" pitchFamily="18" charset="0"/>
-            </a:endParaRPr>
-          </a:p>
-        </p:txBody>
-      </p:sp>
-      <p:sp>
-        <p:nvSpPr>
           <p:cNvPr id="71" name="TextBox 70"/>
           <p:cNvSpPr txBox="1"/>
           <p:nvPr/>
         </p:nvSpPr>
         <p:spPr>
           <a:xfrm flipH="1">
-            <a:off x="4003988" y="893747"/>
+            <a:off x="4003988" y="1053905"/>
             <a:ext cx="3332348" cy="338554"/>
           </a:xfrm>
           <a:prstGeom prst="rect">
@@ -3427,7 +3348,7 @@
         </p:nvCxnSpPr>
         <p:spPr>
           <a:xfrm flipV="1">
-            <a:off x="1828916" y="95713"/>
+            <a:off x="453555" y="255871"/>
             <a:ext cx="0" cy="3386286"/>
           </a:xfrm>
           <a:prstGeom prst="line">
@@ -3464,7 +3385,7 @@
         </p:nvCxnSpPr>
         <p:spPr>
           <a:xfrm>
-            <a:off x="197161" y="1841318"/>
+            <a:off x="456059" y="3642157"/>
             <a:ext cx="3395861" cy="0"/>
           </a:xfrm>
           <a:prstGeom prst="line">
@@ -3501,7 +3422,7 @@
         </p:nvSpPr>
         <p:spPr>
           <a:xfrm>
-            <a:off x="2105916" y="1834223"/>
+            <a:off x="3776033" y="3503657"/>
             <a:ext cx="910377" cy="276999"/>
           </a:xfrm>
           <a:prstGeom prst="rect">
@@ -3529,47 +3450,13 @@
       </p:sp>
       <p:sp>
         <p:nvSpPr>
-          <p:cNvPr id="113" name="TextBox 112"/>
-          <p:cNvSpPr txBox="1"/>
-          <p:nvPr/>
-        </p:nvSpPr>
-        <p:spPr>
-          <a:xfrm rot="16200000">
-            <a:off x="1456571" y="468058"/>
-            <a:ext cx="1021690" cy="276999"/>
-          </a:xfrm>
-          <a:prstGeom prst="rect">
-            <a:avLst/>
-          </a:prstGeom>
-          <a:noFill/>
-        </p:spPr>
-        <p:txBody>
-          <a:bodyPr wrap="none" rtlCol="0">
-            <a:spAutoFit/>
-          </a:bodyPr>
-          <a:lstStyle/>
-          <a:p>
-            <a:r>
-              <a:rPr lang="sv-SE" sz="1200" dirty="0" smtClean="0">
-                <a:latin typeface="Garamond" pitchFamily="18" charset="0"/>
-              </a:rPr>
-              <a:t>Audience Size</a:t>
-            </a:r>
-            <a:endParaRPr lang="sv-SE" sz="1200" dirty="0">
-              <a:latin typeface="Garamond" pitchFamily="18" charset="0"/>
-            </a:endParaRPr>
-          </a:p>
-        </p:txBody>
-      </p:sp>
-      <p:sp>
-        <p:nvSpPr>
           <p:cNvPr id="130" name="Rectangle 129"/>
           <p:cNvSpPr/>
           <p:nvPr/>
         </p:nvSpPr>
         <p:spPr>
           <a:xfrm>
-            <a:off x="3777308" y="935692"/>
+            <a:off x="3777308" y="1095850"/>
             <a:ext cx="254665" cy="254665"/>
           </a:xfrm>
           <a:prstGeom prst="rect">
@@ -3614,7 +3501,7 @@
         </p:nvSpPr>
         <p:spPr>
           <a:xfrm>
-            <a:off x="3777308" y="1321782"/>
+            <a:off x="3777308" y="1481940"/>
             <a:ext cx="254665" cy="254665"/>
           </a:xfrm>
           <a:prstGeom prst="rect">
@@ -3659,7 +3546,7 @@
         </p:nvSpPr>
         <p:spPr>
           <a:xfrm>
-            <a:off x="3777308" y="1707873"/>
+            <a:off x="3777308" y="1868031"/>
             <a:ext cx="254665" cy="254665"/>
           </a:xfrm>
           <a:prstGeom prst="rect">
@@ -3704,7 +3591,7 @@
         </p:nvSpPr>
         <p:spPr>
           <a:xfrm>
-            <a:off x="1568026" y="3219778"/>
+            <a:off x="192665" y="3379936"/>
             <a:ext cx="335348" cy="276999"/>
           </a:xfrm>
           <a:prstGeom prst="rect">
@@ -3738,7 +3625,7 @@
         </p:nvSpPr>
         <p:spPr>
           <a:xfrm>
-            <a:off x="1404837" y="1853471"/>
+            <a:off x="29476" y="2013629"/>
             <a:ext cx="510076" cy="276999"/>
           </a:xfrm>
           <a:prstGeom prst="rect">
@@ -3772,7 +3659,7 @@
         </p:nvSpPr>
         <p:spPr>
           <a:xfrm>
-            <a:off x="1321163" y="239730"/>
+            <a:off x="-54198" y="399888"/>
             <a:ext cx="582211" cy="276999"/>
           </a:xfrm>
           <a:prstGeom prst="rect">
@@ -3806,7 +3693,7 @@
         </p:nvSpPr>
         <p:spPr>
           <a:xfrm>
-            <a:off x="98606" y="1606472"/>
+            <a:off x="357504" y="3600191"/>
             <a:ext cx="370614" cy="276999"/>
           </a:xfrm>
           <a:prstGeom prst="rect">
@@ -3840,7 +3727,7 @@
         </p:nvSpPr>
         <p:spPr>
           <a:xfrm>
-            <a:off x="1460624" y="1606469"/>
+            <a:off x="1719522" y="3600190"/>
             <a:ext cx="442750" cy="276999"/>
           </a:xfrm>
           <a:prstGeom prst="rect">
@@ -3874,7 +3761,7 @@
         </p:nvSpPr>
         <p:spPr>
           <a:xfrm>
-            <a:off x="2977058" y="1624653"/>
+            <a:off x="3235956" y="3600887"/>
             <a:ext cx="514885" cy="276999"/>
           </a:xfrm>
           <a:prstGeom prst="rect">
@@ -3908,8 +3795,8 @@
         </p:nvSpPr>
         <p:spPr>
           <a:xfrm>
-            <a:off x="3715956" y="2389230"/>
-            <a:ext cx="2172774" cy="1015663"/>
+            <a:off x="3715956" y="2549388"/>
+            <a:ext cx="1685911" cy="830997"/>
           </a:xfrm>
           <a:prstGeom prst="rect">
             <a:avLst/>
@@ -3926,8 +3813,31 @@
               <a:rPr lang="sv-SE" sz="1200" dirty="0" smtClean="0">
                 <a:latin typeface="Garamond" pitchFamily="18" charset="0"/>
               </a:rPr>
-              <a:t>5 inches ≈ Phone/Tablet Display</a:t>
-            </a:r>
+              <a:t>Diagnoal of the display</a:t>
+            </a:r>
+          </a:p>
+          <a:p>
+            <a:r>
+              <a:rPr lang="sv-SE" sz="1200" dirty="0" smtClean="0">
+                <a:latin typeface="Garamond" pitchFamily="18" charset="0"/>
+              </a:rPr>
+              <a:t>5 </a:t>
+            </a:r>
+            <a:r>
+              <a:rPr lang="sv-SE" sz="1200" dirty="0" smtClean="0">
+                <a:latin typeface="Garamond" pitchFamily="18" charset="0"/>
+              </a:rPr>
+              <a:t>inches ≈ </a:t>
+            </a:r>
+            <a:r>
+              <a:rPr lang="sv-SE" sz="1200" dirty="0" smtClean="0">
+                <a:latin typeface="Garamond" pitchFamily="18" charset="0"/>
+              </a:rPr>
+              <a:t>Phone/Tablet</a:t>
+            </a:r>
+            <a:endParaRPr lang="sv-SE" sz="1200" dirty="0" smtClean="0">
+              <a:latin typeface="Garamond" pitchFamily="18" charset="0"/>
+            </a:endParaRPr>
           </a:p>
           <a:p>
             <a:r>
@@ -3946,8 +3856,17 @@
               <a:rPr lang="sv-SE" sz="1200" dirty="0" smtClean="0">
                 <a:latin typeface="Garamond" pitchFamily="18" charset="0"/>
               </a:rPr>
-              <a:t>Touch Table</a:t>
-            </a:r>
+              <a:t>Touch </a:t>
+            </a:r>
+            <a:r>
+              <a:rPr lang="sv-SE" sz="1200" dirty="0" smtClean="0">
+                <a:latin typeface="Garamond" pitchFamily="18" charset="0"/>
+              </a:rPr>
+              <a:t>Table</a:t>
+            </a:r>
+            <a:endParaRPr lang="sv-SE" sz="1200" dirty="0" smtClean="0">
+              <a:latin typeface="Garamond" pitchFamily="18" charset="0"/>
+            </a:endParaRPr>
           </a:p>
           <a:p>
             <a:r>
@@ -3972,22 +3891,6 @@
               <a:latin typeface="Garamond" pitchFamily="18" charset="0"/>
             </a:endParaRPr>
           </a:p>
-          <a:p>
-            <a:endParaRPr lang="sv-SE" sz="1200" dirty="0">
-              <a:latin typeface="Garamond" pitchFamily="18" charset="0"/>
-            </a:endParaRPr>
-          </a:p>
-          <a:p>
-            <a:r>
-              <a:rPr lang="sv-SE" sz="1200" dirty="0" smtClean="0">
-                <a:latin typeface="Garamond" pitchFamily="18" charset="0"/>
-              </a:rPr>
-              <a:t> </a:t>
-            </a:r>
-            <a:endParaRPr lang="sv-SE" sz="1200" dirty="0">
-              <a:latin typeface="Garamond" pitchFamily="18" charset="0"/>
-            </a:endParaRPr>
-          </a:p>
         </p:txBody>
       </p:sp>
       <p:sp>
@@ -3998,8 +3901,8 @@
         </p:nvSpPr>
         <p:spPr>
           <a:xfrm>
-            <a:off x="2411760" y="240270"/>
-            <a:ext cx="1066451" cy="1077417"/>
+            <a:off x="2395630" y="433083"/>
+            <a:ext cx="1154590" cy="1303522"/>
           </a:xfrm>
           <a:prstGeom prst="rect">
             <a:avLst/>
@@ -4037,59 +3940,14 @@
       </p:sp>
       <p:sp>
         <p:nvSpPr>
-          <p:cNvPr id="180" name="Rectangle 179"/>
-          <p:cNvSpPr/>
-          <p:nvPr/>
-        </p:nvSpPr>
-        <p:spPr>
-          <a:xfrm>
-            <a:off x="236021" y="2792894"/>
-            <a:ext cx="1355699" cy="565383"/>
-          </a:xfrm>
-          <a:prstGeom prst="rect">
-            <a:avLst/>
-          </a:prstGeom>
-          <a:solidFill>
-            <a:schemeClr val="accent1">
-              <a:alpha val="50000"/>
-            </a:schemeClr>
-          </a:solidFill>
-        </p:spPr>
-        <p:style>
-          <a:lnRef idx="2">
-            <a:schemeClr val="accent1">
-              <a:shade val="50000"/>
-            </a:schemeClr>
-          </a:lnRef>
-          <a:fillRef idx="1">
-            <a:schemeClr val="accent1"/>
-          </a:fillRef>
-          <a:effectRef idx="0">
-            <a:schemeClr val="accent1"/>
-          </a:effectRef>
-          <a:fontRef idx="minor">
-            <a:schemeClr val="lt1"/>
-          </a:fontRef>
-        </p:style>
-        <p:txBody>
-          <a:bodyPr rtlCol="0" anchor="ctr"/>
-          <a:lstStyle/>
-          <a:p>
-            <a:pPr algn="ctr"/>
-            <a:endParaRPr lang="sv-SE" dirty="0" smtClean="0"/>
-          </a:p>
-        </p:txBody>
-      </p:sp>
-      <p:sp>
-        <p:nvSpPr>
           <p:cNvPr id="177" name="Rectangle 176"/>
           <p:cNvSpPr/>
           <p:nvPr/>
         </p:nvSpPr>
         <p:spPr>
           <a:xfrm>
-            <a:off x="98606" y="1451022"/>
-            <a:ext cx="1936002" cy="2030977"/>
+            <a:off x="459627" y="1736605"/>
+            <a:ext cx="1936002" cy="1903644"/>
           </a:xfrm>
           <a:prstGeom prst="rect">
             <a:avLst/>
@@ -4125,11 +3983,52 @@
           </a:p>
         </p:txBody>
       </p:sp>
+      <p:sp>
+        <p:nvSpPr>
+          <p:cNvPr id="26" name="TextBox 25"/>
+          <p:cNvSpPr txBox="1"/>
+          <p:nvPr/>
+        </p:nvSpPr>
+        <p:spPr>
+          <a:xfrm>
+            <a:off x="4438" y="55657"/>
+            <a:ext cx="1021690" cy="276999"/>
+          </a:xfrm>
+          <a:prstGeom prst="rect">
+            <a:avLst/>
+          </a:prstGeom>
+          <a:noFill/>
+        </p:spPr>
+        <p:txBody>
+          <a:bodyPr wrap="none" rtlCol="0">
+            <a:spAutoFit/>
+          </a:bodyPr>
+          <a:lstStyle/>
+          <a:p>
+            <a:r>
+              <a:rPr lang="sv-SE" sz="1200" dirty="0" smtClean="0">
+                <a:latin typeface="Garamond" pitchFamily="18" charset="0"/>
+              </a:rPr>
+              <a:t>Audience Size</a:t>
+            </a:r>
+            <a:endParaRPr lang="sv-SE" sz="1200" dirty="0">
+              <a:latin typeface="Garamond" pitchFamily="18" charset="0"/>
+            </a:endParaRPr>
+          </a:p>
+        </p:txBody>
+      </p:sp>
     </p:spTree>
   </p:cSld>
   <p:clrMapOvr>
     <a:masterClrMapping/>
   </p:clrMapOvr>
+  <p:timing>
+    <p:tnLst>
+      <p:par>
+        <p:cTn id="1" dur="indefinite" restart="never" nodeType="tmRoot"/>
+      </p:par>
+    </p:tnLst>
+  </p:timing>
 </p:sld>
 </file>
 

</xml_diff>